<commit_message>
fix: NGINX Plus OIDC workflow w Amazon Cognito
</commit_message>
<xml_diff>
--- a/docs/img/nginx-oidc-flow.pptx
+++ b/docs/img/nginx-oidc-flow.pptx
@@ -259,7 +259,7 @@
           <a:p>
             <a:fld id="{FD36D0CE-793F-FB41-AD4F-0C45D94A4FBD}" type="datetimeFigureOut">
               <a:rPr lang="en-US" smtClean="0"/>
-              <a:t>9/2/22</a:t>
+              <a:t>9/15/22</a:t>
             </a:fld>
             <a:endParaRPr lang="en-US"/>
           </a:p>
@@ -457,7 +457,7 @@
           <a:p>
             <a:fld id="{FD36D0CE-793F-FB41-AD4F-0C45D94A4FBD}" type="datetimeFigureOut">
               <a:rPr lang="en-US" smtClean="0"/>
-              <a:t>9/2/22</a:t>
+              <a:t>9/15/22</a:t>
             </a:fld>
             <a:endParaRPr lang="en-US"/>
           </a:p>
@@ -665,7 +665,7 @@
           <a:p>
             <a:fld id="{FD36D0CE-793F-FB41-AD4F-0C45D94A4FBD}" type="datetimeFigureOut">
               <a:rPr lang="en-US" smtClean="0"/>
-              <a:t>9/2/22</a:t>
+              <a:t>9/15/22</a:t>
             </a:fld>
             <a:endParaRPr lang="en-US"/>
           </a:p>
@@ -863,7 +863,7 @@
           <a:p>
             <a:fld id="{FD36D0CE-793F-FB41-AD4F-0C45D94A4FBD}" type="datetimeFigureOut">
               <a:rPr lang="en-US" smtClean="0"/>
-              <a:t>9/2/22</a:t>
+              <a:t>9/15/22</a:t>
             </a:fld>
             <a:endParaRPr lang="en-US"/>
           </a:p>
@@ -1138,7 +1138,7 @@
           <a:p>
             <a:fld id="{FD36D0CE-793F-FB41-AD4F-0C45D94A4FBD}" type="datetimeFigureOut">
               <a:rPr lang="en-US" smtClean="0"/>
-              <a:t>9/2/22</a:t>
+              <a:t>9/15/22</a:t>
             </a:fld>
             <a:endParaRPr lang="en-US"/>
           </a:p>
@@ -1403,7 +1403,7 @@
           <a:p>
             <a:fld id="{FD36D0CE-793F-FB41-AD4F-0C45D94A4FBD}" type="datetimeFigureOut">
               <a:rPr lang="en-US" smtClean="0"/>
-              <a:t>9/2/22</a:t>
+              <a:t>9/15/22</a:t>
             </a:fld>
             <a:endParaRPr lang="en-US"/>
           </a:p>
@@ -1815,7 +1815,7 @@
           <a:p>
             <a:fld id="{FD36D0CE-793F-FB41-AD4F-0C45D94A4FBD}" type="datetimeFigureOut">
               <a:rPr lang="en-US" smtClean="0"/>
-              <a:t>9/2/22</a:t>
+              <a:t>9/15/22</a:t>
             </a:fld>
             <a:endParaRPr lang="en-US"/>
           </a:p>
@@ -1956,7 +1956,7 @@
           <a:p>
             <a:fld id="{FD36D0CE-793F-FB41-AD4F-0C45D94A4FBD}" type="datetimeFigureOut">
               <a:rPr lang="en-US" smtClean="0"/>
-              <a:t>9/2/22</a:t>
+              <a:t>9/15/22</a:t>
             </a:fld>
             <a:endParaRPr lang="en-US"/>
           </a:p>
@@ -2069,7 +2069,7 @@
           <a:p>
             <a:fld id="{FD36D0CE-793F-FB41-AD4F-0C45D94A4FBD}" type="datetimeFigureOut">
               <a:rPr lang="en-US" smtClean="0"/>
-              <a:t>9/2/22</a:t>
+              <a:t>9/15/22</a:t>
             </a:fld>
             <a:endParaRPr lang="en-US"/>
           </a:p>
@@ -2380,7 +2380,7 @@
           <a:p>
             <a:fld id="{FD36D0CE-793F-FB41-AD4F-0C45D94A4FBD}" type="datetimeFigureOut">
               <a:rPr lang="en-US" smtClean="0"/>
-              <a:t>9/2/22</a:t>
+              <a:t>9/15/22</a:t>
             </a:fld>
             <a:endParaRPr lang="en-US"/>
           </a:p>
@@ -2668,7 +2668,7 @@
           <a:p>
             <a:fld id="{FD36D0CE-793F-FB41-AD4F-0C45D94A4FBD}" type="datetimeFigureOut">
               <a:rPr lang="en-US" smtClean="0"/>
-              <a:t>9/2/22</a:t>
+              <a:t>9/15/22</a:t>
             </a:fld>
             <a:endParaRPr lang="en-US"/>
           </a:p>
@@ -2909,7 +2909,7 @@
           <a:p>
             <a:fld id="{FD36D0CE-793F-FB41-AD4F-0C45D94A4FBD}" type="datetimeFigureOut">
               <a:rPr lang="en-US" smtClean="0"/>
-              <a:t>9/2/22</a:t>
+              <a:t>9/15/22</a:t>
             </a:fld>
             <a:endParaRPr lang="en-US"/>
           </a:p>
@@ -4386,8 +4386,8 @@
         </p:nvSpPr>
         <p:spPr>
           <a:xfrm>
-            <a:off x="4112682" y="2592066"/>
-            <a:ext cx="702115" cy="123111"/>
+            <a:off x="4165581" y="2486268"/>
+            <a:ext cx="567463" cy="246221"/>
           </a:xfrm>
           <a:prstGeom prst="rect">
             <a:avLst/>
@@ -4403,7 +4403,15 @@
               <a:rPr lang="en-US" altLang="ko-KR" sz="800" dirty="0">
                 <a:latin typeface="Calibri" panose="020F0502020204030204" pitchFamily="34" charset="0"/>
               </a:rPr>
-              <a:t>(1) Login request</a:t>
+              <a:t>(1) (11) </a:t>
+            </a:r>
+          </a:p>
+          <a:p>
+            <a:r>
+              <a:rPr lang="en-US" altLang="ko-KR" sz="800" dirty="0">
+                <a:latin typeface="Calibri" panose="020F0502020204030204" pitchFamily="34" charset="0"/>
+              </a:rPr>
+              <a:t>Login request</a:t>
             </a:r>
             <a:endParaRPr lang="ko-KR" altLang="en-US" sz="800" dirty="0">
               <a:latin typeface="Calibri" panose="020F0502020204030204" pitchFamily="34" charset="0"/>
@@ -4425,8 +4433,8 @@
         </p:nvSpPr>
         <p:spPr>
           <a:xfrm>
-            <a:off x="5284941" y="2924180"/>
-            <a:ext cx="679673" cy="123111"/>
+            <a:off x="5247156" y="2924180"/>
+            <a:ext cx="865622" cy="123111"/>
           </a:xfrm>
           <a:prstGeom prst="rect">
             <a:avLst/>
@@ -4442,7 +4450,7 @@
               <a:rPr lang="en-US" altLang="ko-KR" sz="800" dirty="0">
                 <a:latin typeface="Calibri" panose="020F0502020204030204" pitchFamily="34" charset="0"/>
               </a:rPr>
-              <a:t>(2) Auth request</a:t>
+              <a:t>(2) (12) Auth request</a:t>
             </a:r>
             <a:endParaRPr lang="ko-KR" altLang="en-US" sz="800" dirty="0">
               <a:latin typeface="Calibri" panose="020F0502020204030204" pitchFamily="34" charset="0"/>
@@ -4569,7 +4577,7 @@
                 </a:solidFill>
                 <a:latin typeface="Calibri" panose="020F0502020204030204" pitchFamily="34" charset="0"/>
               </a:rPr>
-              <a:t>(3) (11) NGINX Plus exchanges authorization code for ID / access token</a:t>
+              <a:t>(3) (13) NGINX Plus exchanges authorization code for ID / access token</a:t>
             </a:r>
             <a:endParaRPr lang="ko-KR" altLang="en-US" sz="800" dirty="0">
               <a:solidFill>
@@ -4641,8 +4649,8 @@
         </p:nvSpPr>
         <p:spPr>
           <a:xfrm>
-            <a:off x="4047124" y="2965122"/>
-            <a:ext cx="679991" cy="246221"/>
+            <a:off x="4047124" y="2859324"/>
+            <a:ext cx="679991" cy="369332"/>
           </a:xfrm>
           <a:prstGeom prst="rect">
             <a:avLst/>
@@ -4659,7 +4667,16 @@
               <a:rPr lang="en-US" altLang="ko-KR" sz="800" dirty="0">
                 <a:latin typeface="Calibri" panose="020F0502020204030204" pitchFamily="34" charset="0"/>
               </a:rPr>
-              <a:t>(4) Redirect to original URI</a:t>
+              <a:t>(4) (14) </a:t>
+            </a:r>
+          </a:p>
+          <a:p>
+            <a:pPr algn="r"/>
+            <a:r>
+              <a:rPr lang="en-US" altLang="ko-KR" sz="800" dirty="0">
+                <a:latin typeface="Calibri" panose="020F0502020204030204" pitchFamily="34" charset="0"/>
+              </a:rPr>
+              <a:t>Redirect to original URI</a:t>
             </a:r>
             <a:endParaRPr lang="ko-KR" altLang="en-US" sz="800" dirty="0">
               <a:latin typeface="Calibri" panose="020F0502020204030204" pitchFamily="34" charset="0"/>
@@ -4778,8 +4795,8 @@
         </p:nvSpPr>
         <p:spPr>
           <a:xfrm>
-            <a:off x="4165016" y="3559244"/>
-            <a:ext cx="654968" cy="369332"/>
+            <a:off x="4165016" y="3453446"/>
+            <a:ext cx="654968" cy="492443"/>
           </a:xfrm>
           <a:prstGeom prst="rect">
             <a:avLst/>
@@ -4796,7 +4813,7 @@
               <a:rPr lang="en-US" altLang="ko-KR" sz="800" dirty="0">
                 <a:latin typeface="Calibri" panose="020F0502020204030204" pitchFamily="34" charset="0"/>
               </a:rPr>
-              <a:t>(5) Request /response</a:t>
+              <a:t>(5) (15) Request /response</a:t>
             </a:r>
           </a:p>
           <a:p>
@@ -4827,8 +4844,8 @@
         </p:nvSpPr>
         <p:spPr>
           <a:xfrm>
-            <a:off x="6219296" y="3299993"/>
-            <a:ext cx="580527" cy="369332"/>
+            <a:off x="6219296" y="3428462"/>
+            <a:ext cx="580527" cy="492443"/>
           </a:xfrm>
           <a:prstGeom prst="rect">
             <a:avLst/>
@@ -4845,7 +4862,7 @@
               <a:rPr lang="en-US" altLang="ko-KR" sz="800" dirty="0">
                 <a:latin typeface="Calibri" panose="020F0502020204030204" pitchFamily="34" charset="0"/>
               </a:rPr>
-              <a:t>(6) Request /response</a:t>
+              <a:t>(6) (16) Request /response</a:t>
             </a:r>
           </a:p>
           <a:p>
@@ -4987,18 +5004,17 @@
           </p:cNvPr>
           <p:cNvCxnSpPr>
             <a:cxnSpLocks/>
+            <a:endCxn id="36" idx="0"/>
           </p:cNvCxnSpPr>
           <p:nvPr/>
         </p:nvCxnSpPr>
         <p:spPr>
           <a:xfrm>
-            <a:off x="3925732" y="4065264"/>
-            <a:ext cx="1049997" cy="239643"/>
-          </a:xfrm>
-          <a:prstGeom prst="bentConnector3">
-            <a:avLst>
-              <a:gd name="adj1" fmla="val 32321"/>
-            </a:avLst>
+            <a:off x="3914828" y="4041111"/>
+            <a:ext cx="1614637" cy="80691"/>
+          </a:xfrm>
+          <a:prstGeom prst="bentConnector2">
+            <a:avLst/>
           </a:prstGeom>
           <a:ln>
             <a:solidFill>
@@ -5090,19 +5106,18 @@
           </p:cNvPr>
           <p:cNvCxnSpPr>
             <a:cxnSpLocks/>
-            <a:stCxn id="36" idx="0"/>
+            <a:stCxn id="48" idx="1"/>
+            <a:endCxn id="57" idx="2"/>
           </p:cNvCxnSpPr>
           <p:nvPr/>
         </p:nvCxnSpPr>
         <p:spPr>
-          <a:xfrm rot="5400000" flipH="1" flipV="1">
-            <a:off x="5389937" y="3530516"/>
-            <a:ext cx="730815" cy="451759"/>
-          </a:xfrm>
-          <a:prstGeom prst="bentConnector3">
-            <a:avLst>
-              <a:gd name="adj1" fmla="val 21778"/>
-            </a:avLst>
+          <a:xfrm rot="10800000">
+            <a:off x="3804447" y="3718073"/>
+            <a:ext cx="1171283" cy="586834"/>
+          </a:xfrm>
+          <a:prstGeom prst="bentConnector2">
+            <a:avLst/>
           </a:prstGeom>
           <a:ln>
             <a:solidFill>
@@ -5140,8 +5155,8 @@
         </p:nvSpPr>
         <p:spPr>
           <a:xfrm>
-            <a:off x="4247017" y="4143052"/>
-            <a:ext cx="580527" cy="123111"/>
+            <a:off x="4074515" y="4037254"/>
+            <a:ext cx="753029" cy="123111"/>
           </a:xfrm>
           <a:prstGeom prst="rect">
             <a:avLst/>
@@ -5158,7 +5173,7 @@
               <a:rPr lang="en-US" altLang="ko-KR" sz="800" dirty="0">
                 <a:latin typeface="Calibri" panose="020F0502020204030204" pitchFamily="34" charset="0"/>
               </a:rPr>
-              <a:t>(7) Call APIs</a:t>
+              <a:t>(7) (17) Call APIs</a:t>
             </a:r>
             <a:endParaRPr lang="ko-KR" altLang="en-US" sz="800" dirty="0">
               <a:latin typeface="Calibri" panose="020F0502020204030204" pitchFamily="34" charset="0"/>
@@ -5227,7 +5242,7 @@
         </p:nvSpPr>
         <p:spPr>
           <a:xfrm>
-            <a:off x="4935642" y="3949143"/>
+            <a:off x="4269915" y="4312760"/>
             <a:ext cx="580527" cy="123111"/>
           </a:xfrm>
           <a:prstGeom prst="rect">
@@ -5315,8 +5330,8 @@
         </p:nvSpPr>
         <p:spPr>
           <a:xfrm>
-            <a:off x="6395896" y="3894079"/>
-            <a:ext cx="580527" cy="246221"/>
+            <a:off x="6104934" y="3946978"/>
+            <a:ext cx="901718" cy="246221"/>
           </a:xfrm>
           <a:prstGeom prst="rect">
             <a:avLst/>
@@ -5333,7 +5348,7 @@
               <a:rPr lang="en-US" altLang="ko-KR" sz="800" dirty="0">
                 <a:latin typeface="Calibri" panose="020F0502020204030204" pitchFamily="34" charset="0"/>
               </a:rPr>
-              <a:t>(8) Token validation</a:t>
+              <a:t>(8) (18) Token validation</a:t>
             </a:r>
             <a:endParaRPr lang="ko-KR" altLang="en-US" sz="800" dirty="0">
               <a:latin typeface="Calibri" panose="020F0502020204030204" pitchFamily="34" charset="0"/>
@@ -5420,7 +5435,7 @@
               <a:rPr lang="en-US" altLang="ko-KR" sz="800" dirty="0">
                 <a:latin typeface="Calibri" panose="020F0502020204030204" pitchFamily="34" charset="0"/>
               </a:rPr>
-              <a:t>(12) Logout request</a:t>
+              <a:t>(20) Logout request</a:t>
             </a:r>
             <a:endParaRPr lang="ko-KR" altLang="en-US" sz="800" dirty="0">
               <a:latin typeface="Calibri" panose="020F0502020204030204" pitchFamily="34" charset="0"/>
@@ -5668,7 +5683,7 @@
         <p:spPr>
           <a:xfrm>
             <a:off x="6092773" y="4328647"/>
-            <a:ext cx="580527" cy="123111"/>
+            <a:ext cx="580527" cy="246221"/>
           </a:xfrm>
           <a:prstGeom prst="rect">
             <a:avLst/>
@@ -5685,7 +5700,16 @@
               <a:rPr lang="en-US" altLang="ko-KR" sz="800" dirty="0">
                 <a:latin typeface="Calibri" panose="020F0502020204030204" pitchFamily="34" charset="0"/>
               </a:rPr>
-              <a:t>(9) valid?</a:t>
+              <a:t>(9) (19) </a:t>
+            </a:r>
+          </a:p>
+          <a:p>
+            <a:pPr algn="r"/>
+            <a:r>
+              <a:rPr lang="en-US" altLang="ko-KR" sz="800" dirty="0">
+                <a:latin typeface="Calibri" panose="020F0502020204030204" pitchFamily="34" charset="0"/>
+              </a:rPr>
+              <a:t>valid?</a:t>
             </a:r>
             <a:endParaRPr lang="ko-KR" altLang="en-US" sz="800" dirty="0">
               <a:latin typeface="Calibri" panose="020F0502020204030204" pitchFamily="34" charset="0"/>
@@ -5774,7 +5798,7 @@
               <a:rPr lang="en-US" altLang="ko-KR" sz="800" dirty="0">
                 <a:latin typeface="Calibri" panose="020F0502020204030204" pitchFamily="34" charset="0"/>
               </a:rPr>
-              <a:t>(13) Logout</a:t>
+              <a:t>(21) Logout</a:t>
             </a:r>
             <a:endParaRPr lang="ko-KR" altLang="en-US" sz="800" dirty="0">
               <a:latin typeface="Calibri" panose="020F0502020204030204" pitchFamily="34" charset="0"/>
@@ -5871,42 +5895,116 @@
           </a:p>
         </p:txBody>
       </p:sp>
+      <p:sp>
+        <p:nvSpPr>
+          <p:cNvPr id="2" name="직사각형 363">
+            <a:extLst>
+              <a:ext uri="{FF2B5EF4-FFF2-40B4-BE49-F238E27FC236}">
+                <a16:creationId xmlns:a16="http://schemas.microsoft.com/office/drawing/2014/main" id="{50842FBC-583B-56B6-F325-01BC137C4C4D}"/>
+              </a:ext>
+            </a:extLst>
+          </p:cNvPr>
+          <p:cNvSpPr/>
+          <p:nvPr/>
+        </p:nvSpPr>
+        <p:spPr>
+          <a:xfrm>
+            <a:off x="4974332" y="2801316"/>
+            <a:ext cx="45719" cy="61556"/>
+          </a:xfrm>
+          <a:prstGeom prst="rect">
+            <a:avLst/>
+          </a:prstGeom>
+          <a:solidFill>
+            <a:schemeClr val="accent6">
+              <a:lumMod val="20000"/>
+              <a:lumOff val="80000"/>
+            </a:schemeClr>
+          </a:solidFill>
+          <a:ln w="3175" cap="flat" cmpd="sng" algn="ctr">
+            <a:solidFill>
+              <a:schemeClr val="accent6">
+                <a:lumMod val="20000"/>
+                <a:lumOff val="80000"/>
+              </a:schemeClr>
+            </a:solidFill>
+            <a:prstDash val="solid"/>
+            <a:miter lim="800000"/>
+          </a:ln>
+          <a:effectLst/>
+        </p:spPr>
+        <p:txBody>
+          <a:bodyPr rtlCol="0" anchor="ctr"/>
+          <a:lstStyle/>
+          <a:p>
+            <a:pPr algn="ctr">
+              <a:lnSpc>
+                <a:spcPct val="80000"/>
+              </a:lnSpc>
+            </a:pPr>
+            <a:endParaRPr lang="en-US" altLang="ko-KR" sz="1100" kern="0" dirty="0">
+              <a:solidFill>
+                <a:prstClr val="black"/>
+              </a:solidFill>
+              <a:latin typeface="Calibri" panose="020F0502020204030204" pitchFamily="34" charset="0"/>
+              <a:ea typeface="맑은 고딕"/>
+            </a:endParaRPr>
+          </a:p>
+        </p:txBody>
+      </p:sp>
       <p:pic>
         <p:nvPicPr>
-          <p:cNvPr id="53" name="Picture 52">
-            <a:extLst>
-              <a:ext uri="{FF2B5EF4-FFF2-40B4-BE49-F238E27FC236}">
-                <a16:creationId xmlns:a16="http://schemas.microsoft.com/office/drawing/2014/main" id="{4B9686DF-FFFA-960D-E898-10ACD996ED84}"/>
+          <p:cNvPr id="1026" name="Picture 2" descr="AWS — Improving System Resilience While Being Commercially Reasonable. | by  Dishan Metihakwala | Medium">
+            <a:extLst>
+              <a:ext uri="{FF2B5EF4-FFF2-40B4-BE49-F238E27FC236}">
+                <a16:creationId xmlns:a16="http://schemas.microsoft.com/office/drawing/2014/main" id="{F37DE23A-1C0C-3FFD-8856-B2371A5B0C00}"/>
               </a:ext>
             </a:extLst>
           </p:cNvPr>
           <p:cNvPicPr>
-            <a:picLocks noChangeAspect="1"/>
+            <a:picLocks noChangeAspect="1" noChangeArrowheads="1"/>
           </p:cNvPicPr>
           <p:nvPr/>
         </p:nvPicPr>
         <p:blipFill>
-          <a:blip r:embed="rId9"/>
+          <a:blip r:embed="rId9">
+            <a:extLst>
+              <a:ext uri="{28A0092B-C50C-407E-A947-70E740481C1C}">
+                <a14:useLocalDpi xmlns:a14="http://schemas.microsoft.com/office/drawing/2010/main" val="0"/>
+              </a:ext>
+            </a:extLst>
+          </a:blip>
+          <a:srcRect/>
           <a:stretch>
             <a:fillRect/>
           </a:stretch>
         </p:blipFill>
-        <p:spPr>
-          <a:xfrm>
-            <a:off x="7432175" y="1873203"/>
-            <a:ext cx="842591" cy="305632"/>
+        <p:spPr bwMode="auto">
+          <a:xfrm>
+            <a:off x="7458894" y="1733570"/>
+            <a:ext cx="854209" cy="760892"/>
           </a:xfrm>
           <a:prstGeom prst="rect">
             <a:avLst/>
           </a:prstGeom>
+          <a:noFill/>
+          <a:extLst>
+            <a:ext uri="{909E8E84-426E-40DD-AFC4-6F175D3DCCD1}">
+              <a14:hiddenFill xmlns:a14="http://schemas.microsoft.com/office/drawing/2010/main">
+                <a:solidFill>
+                  <a:srgbClr val="FFFFFF"/>
+                </a:solidFill>
+              </a14:hiddenFill>
+            </a:ext>
+          </a:extLst>
         </p:spPr>
       </p:pic>
       <p:sp>
         <p:nvSpPr>
-          <p:cNvPr id="2" name="직사각형 363">
-            <a:extLst>
-              <a:ext uri="{FF2B5EF4-FFF2-40B4-BE49-F238E27FC236}">
-                <a16:creationId xmlns:a16="http://schemas.microsoft.com/office/drawing/2014/main" id="{50842FBC-583B-56B6-F325-01BC137C4C4D}"/>
+          <p:cNvPr id="57" name="직사각형 363">
+            <a:extLst>
+              <a:ext uri="{FF2B5EF4-FFF2-40B4-BE49-F238E27FC236}">
+                <a16:creationId xmlns:a16="http://schemas.microsoft.com/office/drawing/2014/main" id="{E86A99E9-3CE2-926E-2A0B-C78C9A7F1359}"/>
               </a:ext>
             </a:extLst>
           </p:cNvPr>
@@ -5915,7 +6013,7 @@
         </p:nvSpPr>
         <p:spPr>
           <a:xfrm>
-            <a:off x="4974332" y="2801316"/>
+            <a:off x="3781586" y="3656517"/>
             <a:ext cx="45719" cy="61556"/>
           </a:xfrm>
           <a:prstGeom prst="rect">

</xml_diff>